<commit_message>
Add Metric Results to Poster and Update Manuscript to Match Poster's Content
</commit_message>
<xml_diff>
--- a/poster/Gunshot Detection Project Poster.pptx
+++ b/poster/Gunshot Detection Project Poster.pptx
@@ -263,16 +263,6 @@
     </p:ext>
   </p:extLst>
 </p:presentation>
-</file>
-
-<file path=ppt/revisionInfo.xml><?xml version="1.0" encoding="utf-8"?>
-<p1510:revInfo xmlns:a="http://schemas.openxmlformats.org/drawingml/2006/main" xmlns:r="http://schemas.openxmlformats.org/officeDocument/2006/relationships" xmlns:p1510="http://schemas.microsoft.com/office/powerpoint/2015/10/main">
-  <p1510:revLst>
-    <p1510:client id="{4DA6E9EF-12D7-4528-8D40-DC6CC5B9BDB9}" v="23" dt="2019-07-16T17:14:31.031"/>
-    <p1510:client id="{935F0A48-F1A1-D468-59D3-C477A85FBFAB}" v="142" dt="2019-07-16T18:09:31.009"/>
-    <p1510:client id="{CFAC5A47-F7E2-725F-9E4D-4DD113ACDC4C}" v="5" dt="2019-07-16T20:48:10.935"/>
-  </p1510:revLst>
-</p1510:revInfo>
 </file>
 
 <file path=ppt/notesMasters/notesMaster1.xml><?xml version="1.0" encoding="utf-8"?>
@@ -6734,16 +6724,13 @@
           </a:bodyPr>
           <a:lstStyle/>
           <a:p>
-            <a:pPr lvl="0"/>
             <a:r>
               <a:rPr lang="en-US" sz="3000" dirty="0">
                 <a:latin typeface="Cambria"/>
-                <a:ea typeface="Cambria"/>
-                <a:cs typeface="Cambria"/>
-                <a:sym typeface="Cambria"/>
               </a:rPr>
               <a:t>We gratefully acknowledge the support of NSF grant REU-1659488 which provided this project’s research stipends, travel funds, and supply money.</a:t>
             </a:r>
+            <a:endParaRPr lang="en-US"/>
           </a:p>
         </p:txBody>
       </p:sp>
@@ -6872,7 +6859,25 @@
                 <a:cs typeface="Cambria"/>
                 <a:sym typeface="Cambria"/>
               </a:rPr>
-              <a:t>We obtained out data from two places: free internet  databases such as Freesound and a repository of sounds recorded using a microphone connected to a Raspberry Pi microcomputer. In addition to this, we used a generative adversarial network (GAN) as well as sound augmentations to create additional samples of gunfire sounds and to prevent our model from overfitting to our compiled dataset.</a:t>
+              <a:t>We obtained our data from two places: free internet  databases such as </a:t>
+            </a:r>
+            <a:r>
+              <a:rPr lang="en-US" sz="3000" dirty="0" err="1">
+                <a:latin typeface="Cambria"/>
+                <a:ea typeface="Cambria"/>
+                <a:cs typeface="Cambria"/>
+                <a:sym typeface="Cambria"/>
+              </a:rPr>
+              <a:t>Freesound</a:t>
+            </a:r>
+            <a:r>
+              <a:rPr lang="en-US" sz="3000" dirty="0">
+                <a:latin typeface="Cambria"/>
+                <a:ea typeface="Cambria"/>
+                <a:cs typeface="Cambria"/>
+                <a:sym typeface="Cambria"/>
+              </a:rPr>
+              <a:t> and a repository of sounds recorded using a microphone connected to a Raspberry Pi microcomputer. In addition to this, we used a generative adversarial network (GAN) as well as sound augmentations to create additional samples of gunfire sounds and to prevent our model from overfitting to our compiled dataset.</a:t>
             </a:r>
             <a:endParaRPr sz="3000" dirty="0">
               <a:latin typeface="Cambria"/>
@@ -7638,7 +7643,7 @@
           <p:nvPr>
             <p:extLst>
               <p:ext uri="{D42A27DB-BD31-4B8C-83A1-F6EECF244321}">
-                <p14:modId xmlns:p14="http://schemas.microsoft.com/office/powerpoint/2010/main" val="3109852899"/>
+                <p14:modId xmlns:p14="http://schemas.microsoft.com/office/powerpoint/2010/main" val="3283202816"/>
               </p:ext>
             </p:extLst>
           </p:nvPr>
@@ -7733,15 +7738,20 @@
                         <a:buNone/>
                       </a:pPr>
                       <a:r>
+                        <a:rPr lang="en-US" sz="2000" dirty="0"/>
+                        <a:t>2D</a:t>
+                      </a:r>
+                      <a:r>
                         <a:rPr lang="en-US" sz="2000" dirty="0">
                           <a:sym typeface="Cambria"/>
                         </a:rPr>
-                        <a:t>1D Convolutional Neural Network</a:t>
+                        <a:t> Convolutional Neural Network</a:t>
+                      </a:r>
+                      <a:r>
+                        <a:rPr lang="en-US" sz="2000"/>
+                        <a:t> (128 x 64)</a:t>
                       </a:r>
                       <a:endParaRPr lang="en-US" sz="2000" dirty="0">
-                        <a:latin typeface="+mn-lt"/>
-                        <a:ea typeface="Cambria"/>
-                        <a:cs typeface="Cambria"/>
                         <a:sym typeface="Cambria"/>
                       </a:endParaRPr>
                     </a:p>
@@ -7780,7 +7790,11 @@
                       </a:r>
                       <a:r>
                         <a:rPr lang="en-US" sz="2000" dirty="0"/>
-                        <a:t> Neural Network</a:t>
+                        <a:t> Neural </a:t>
+                      </a:r>
+                      <a:r>
+                        <a:rPr lang="en-US" sz="2000"/>
+                        <a:t>Network (128 x 128)</a:t>
                       </a:r>
                       <a:endParaRPr lang="en-US" sz="2000" dirty="0">
                         <a:latin typeface="+mn-lt"/>
@@ -7832,8 +7846,8 @@
                         <a:buNone/>
                       </a:pPr>
                       <a:r>
-                        <a:rPr lang="en-US" sz="2000" dirty="0"/>
-                        <a:t>(1D + 2D)</a:t>
+                        <a:rPr lang="en-US" sz="2000"/>
+                        <a:t>(64 Model + 128 Model)</a:t>
                       </a:r>
                       <a:endParaRPr lang="en-US" sz="2000" dirty="0">
                         <a:latin typeface="+mn-lt"/>
@@ -8034,10 +8048,10 @@
                     <a:p>
                       <a:pPr algn="ctr"/>
                       <a:r>
-                        <a:rPr lang="en-US" sz="2000" dirty="0">
+                        <a:rPr lang="en-US" sz="2000">
                           <a:latin typeface="+mn-lt"/>
                         </a:rPr>
-                        <a:t>97.9%</a:t>
+                        <a:t>98.8%</a:t>
                       </a:r>
                     </a:p>
                   </a:txBody>
@@ -8066,11 +8080,14 @@
                     <a:p>
                       <a:pPr algn="ctr"/>
                       <a:r>
-                        <a:rPr lang="en-US" sz="2000" dirty="0">
+                        <a:rPr lang="en-US" sz="2000">
                           <a:latin typeface="+mn-lt"/>
                         </a:rPr>
                         <a:t>98.8%</a:t>
                       </a:r>
+                      <a:endParaRPr lang="en-US" sz="2000" dirty="0">
+                        <a:latin typeface="+mn-lt"/>
+                      </a:endParaRPr>
                     </a:p>
                   </a:txBody>
                   <a:tcPr marL="65739" marR="65739" marT="32870" marB="32870"/>
@@ -8116,11 +8133,14 @@
                     <a:p>
                       <a:pPr algn="ctr"/>
                       <a:r>
-                        <a:rPr lang="en-US" sz="2000" dirty="0">
+                        <a:rPr lang="en-US" sz="2000">
                           <a:latin typeface="+mn-lt"/>
                         </a:rPr>
-                        <a:t>N/A</a:t>
+                        <a:t>98.8%</a:t>
                       </a:r>
+                      <a:endParaRPr lang="en-US" sz="2000" dirty="0">
+                        <a:latin typeface="+mn-lt"/>
+                      </a:endParaRPr>
                     </a:p>
                   </a:txBody>
                   <a:tcPr marL="65739" marR="65739" marT="32870" marB="32870"/>
@@ -8172,39 +8192,7 @@
                     <a:p>
                       <a:pPr algn="ctr"/>
                       <a:r>
-                        <a:rPr lang="en-US" sz="2000" dirty="0">
-                          <a:latin typeface="+mn-lt"/>
-                        </a:rPr>
-                        <a:t>95.6%</a:t>
-                      </a:r>
-                    </a:p>
-                  </a:txBody>
-                  <a:tcPr marL="65739" marR="65739" marT="32870" marB="32870"/>
-                </a:tc>
-                <a:tc>
-                  <a:txBody>
-                    <a:bodyPr/>
-                    <a:lstStyle/>
-                    <a:p>
-                      <a:pPr algn="ctr"/>
-                      <a:r>
-                        <a:rPr lang="en-US" sz="2000" dirty="0">
-                          <a:latin typeface="+mn-lt"/>
-                        </a:rPr>
-                        <a:t>N/A</a:t>
-                      </a:r>
-                    </a:p>
-                  </a:txBody>
-                  <a:tcPr marL="65739" marR="65739" marT="32870" marB="32870"/>
-                </a:tc>
-                <a:tc>
-                  <a:txBody>
-                    <a:bodyPr/>
-                    <a:lstStyle/>
-                    <a:p>
-                      <a:pPr algn="ctr"/>
-                      <a:r>
-                        <a:rPr lang="en-US" sz="2000" dirty="0">
+                        <a:rPr lang="en-US" sz="2000">
                           <a:latin typeface="+mn-lt"/>
                         </a:rPr>
                         <a:t>96.5%</a:t>
@@ -8236,11 +8224,46 @@
                     <a:p>
                       <a:pPr algn="ctr"/>
                       <a:r>
+                        <a:rPr lang="en-US" sz="2000">
+                          <a:latin typeface="+mn-lt"/>
+                        </a:rPr>
+                        <a:t>94.3%</a:t>
+                      </a:r>
+                    </a:p>
+                  </a:txBody>
+                  <a:tcPr marL="65739" marR="65739" marT="32870" marB="32870"/>
+                </a:tc>
+                <a:tc>
+                  <a:txBody>
+                    <a:bodyPr/>
+                    <a:lstStyle/>
+                    <a:p>
+                      <a:pPr algn="ctr"/>
+                      <a:r>
                         <a:rPr lang="en-US" sz="2000" dirty="0">
                           <a:latin typeface="+mn-lt"/>
                         </a:rPr>
                         <a:t>N/A</a:t>
                       </a:r>
+                    </a:p>
+                  </a:txBody>
+                  <a:tcPr marL="65739" marR="65739" marT="32870" marB="32870"/>
+                </a:tc>
+                <a:tc>
+                  <a:txBody>
+                    <a:bodyPr/>
+                    <a:lstStyle/>
+                    <a:p>
+                      <a:pPr algn="ctr"/>
+                      <a:r>
+                        <a:rPr lang="en-US" sz="2000">
+                          <a:latin typeface="+mn-lt"/>
+                        </a:rPr>
+                        <a:t>97.1%</a:t>
+                      </a:r>
+                      <a:endParaRPr lang="en-US" sz="2000" dirty="0">
+                        <a:latin typeface="+mn-lt"/>
+                      </a:endParaRPr>
                     </a:p>
                   </a:txBody>
                   <a:tcPr marL="65739" marR="65739" marT="32870" marB="32870"/>
@@ -8292,39 +8315,7 @@
                     <a:p>
                       <a:pPr algn="ctr"/>
                       <a:r>
-                        <a:rPr lang="en-US" sz="2000" dirty="0">
-                          <a:latin typeface="+mn-lt"/>
-                        </a:rPr>
-                        <a:t>86.9%</a:t>
-                      </a:r>
-                    </a:p>
-                  </a:txBody>
-                  <a:tcPr marL="65739" marR="65739" marT="32870" marB="32870"/>
-                </a:tc>
-                <a:tc>
-                  <a:txBody>
-                    <a:bodyPr/>
-                    <a:lstStyle/>
-                    <a:p>
-                      <a:pPr algn="ctr"/>
-                      <a:r>
-                        <a:rPr lang="en-US" sz="2000" dirty="0">
-                          <a:latin typeface="+mn-lt"/>
-                        </a:rPr>
-                        <a:t>N/A</a:t>
-                      </a:r>
-                    </a:p>
-                  </a:txBody>
-                  <a:tcPr marL="65739" marR="65739" marT="32870" marB="32870"/>
-                </a:tc>
-                <a:tc>
-                  <a:txBody>
-                    <a:bodyPr/>
-                    <a:lstStyle/>
-                    <a:p>
-                      <a:pPr algn="ctr"/>
-                      <a:r>
-                        <a:rPr lang="en-US" sz="2000" dirty="0">
+                        <a:rPr lang="en-US" sz="2000">
                           <a:latin typeface="+mn-lt"/>
                         </a:rPr>
                         <a:t>93.8%</a:t>
@@ -8356,11 +8347,46 @@
                     <a:p>
                       <a:pPr algn="ctr"/>
                       <a:r>
+                        <a:rPr lang="en-US" sz="2000">
+                          <a:latin typeface="+mn-lt"/>
+                        </a:rPr>
+                        <a:t>96.2%</a:t>
+                      </a:r>
+                    </a:p>
+                  </a:txBody>
+                  <a:tcPr marL="65739" marR="65739" marT="32870" marB="32870"/>
+                </a:tc>
+                <a:tc>
+                  <a:txBody>
+                    <a:bodyPr/>
+                    <a:lstStyle/>
+                    <a:p>
+                      <a:pPr algn="ctr"/>
+                      <a:r>
                         <a:rPr lang="en-US" sz="2000" dirty="0">
                           <a:latin typeface="+mn-lt"/>
                         </a:rPr>
                         <a:t>N/A</a:t>
                       </a:r>
+                    </a:p>
+                  </a:txBody>
+                  <a:tcPr marL="65739" marR="65739" marT="32870" marB="32870"/>
+                </a:tc>
+                <a:tc>
+                  <a:txBody>
+                    <a:bodyPr/>
+                    <a:lstStyle/>
+                    <a:p>
+                      <a:pPr lvl="0" algn="ctr">
+                        <a:buNone/>
+                      </a:pPr>
+                      <a:r>
+                        <a:rPr lang="en-US" sz="2000" b="0" i="0" u="none" strike="noStrike" noProof="0">
+                          <a:latin typeface="Arial"/>
+                        </a:rPr>
+                        <a:t>92.9%</a:t>
+                      </a:r>
+                      <a:endParaRPr lang="en-US"/>
                     </a:p>
                   </a:txBody>
                   <a:tcPr marL="65739" marR="65739" marT="32870" marB="32870"/>
@@ -8412,39 +8438,7 @@
                     <a:p>
                       <a:pPr algn="ctr"/>
                       <a:r>
-                        <a:rPr lang="en-US" sz="2000" dirty="0">
-                          <a:latin typeface="+mn-lt"/>
-                        </a:rPr>
-                        <a:t>91.0%</a:t>
-                      </a:r>
-                    </a:p>
-                  </a:txBody>
-                  <a:tcPr marL="65739" marR="65739" marT="32870" marB="32870"/>
-                </a:tc>
-                <a:tc>
-                  <a:txBody>
-                    <a:bodyPr/>
-                    <a:lstStyle/>
-                    <a:p>
-                      <a:pPr algn="ctr"/>
-                      <a:r>
-                        <a:rPr lang="en-US" sz="2000" dirty="0">
-                          <a:latin typeface="+mn-lt"/>
-                        </a:rPr>
-                        <a:t>N/A</a:t>
-                      </a:r>
-                    </a:p>
-                  </a:txBody>
-                  <a:tcPr marL="65739" marR="65739" marT="32870" marB="32870"/>
-                </a:tc>
-                <a:tc>
-                  <a:txBody>
-                    <a:bodyPr/>
-                    <a:lstStyle/>
-                    <a:p>
-                      <a:pPr algn="ctr"/>
-                      <a:r>
-                        <a:rPr lang="en-US" sz="2000" dirty="0">
+                        <a:rPr lang="en-US" sz="2000">
                           <a:latin typeface="+mn-lt"/>
                         </a:rPr>
                         <a:t>95.1%</a:t>
@@ -8476,11 +8470,46 @@
                     <a:p>
                       <a:pPr algn="ctr"/>
                       <a:r>
+                        <a:rPr lang="en-US" sz="2000">
+                          <a:latin typeface="+mn-lt"/>
+                        </a:rPr>
+                        <a:t>95.2%</a:t>
+                      </a:r>
+                    </a:p>
+                  </a:txBody>
+                  <a:tcPr marL="65739" marR="65739" marT="32870" marB="32870"/>
+                </a:tc>
+                <a:tc>
+                  <a:txBody>
+                    <a:bodyPr/>
+                    <a:lstStyle/>
+                    <a:p>
+                      <a:pPr algn="ctr"/>
+                      <a:r>
                         <a:rPr lang="en-US" sz="2000" dirty="0">
                           <a:latin typeface="+mn-lt"/>
                         </a:rPr>
                         <a:t>N/A</a:t>
                       </a:r>
+                    </a:p>
+                  </a:txBody>
+                  <a:tcPr marL="65739" marR="65739" marT="32870" marB="32870"/>
+                </a:tc>
+                <a:tc>
+                  <a:txBody>
+                    <a:bodyPr/>
+                    <a:lstStyle/>
+                    <a:p>
+                      <a:pPr lvl="0" algn="ctr">
+                        <a:buNone/>
+                      </a:pPr>
+                      <a:r>
+                        <a:rPr lang="en-US" sz="2000" b="0" i="0" u="none" strike="noStrike" noProof="0">
+                          <a:latin typeface="Arial"/>
+                        </a:rPr>
+                        <a:t>95.0%</a:t>
+                      </a:r>
+                      <a:endParaRPr lang="en-US"/>
                     </a:p>
                   </a:txBody>
                   <a:tcPr marL="65739" marR="65739" marT="32870" marB="32870"/>

</xml_diff>